<commit_message>
#100 Bild vom Terminal eingefügt
</commit_message>
<xml_diff>
--- a/belegabgabe_se2/Präsentation/SE_Anwesenheitserfassung.pptx
+++ b/belegabgabe_se2/Präsentation/SE_Anwesenheitserfassung.pptx
@@ -204,7 +204,7 @@
           <a:p>
             <a:fld id="{6D5D3942-F7A5-4215-85FD-33C227C03AD6}" type="datetimeFigureOut">
               <a:rPr lang="de-DE" smtClean="0"/>
-              <a:t>27.06.2021</a:t>
+              <a:t>29.06.2021</a:t>
             </a:fld>
             <a:endParaRPr lang="de-DE"/>
           </a:p>
@@ -702,7 +702,7 @@
           <a:p>
             <a:fld id="{650A9F85-D531-D848-B75D-6ED874705FDB}" type="datetimeFigureOut">
               <a:rPr lang="de-DE" smtClean="0"/>
-              <a:t>27.06.2021</a:t>
+              <a:t>29.06.2021</a:t>
             </a:fld>
             <a:endParaRPr lang="de-DE"/>
           </a:p>
@@ -900,7 +900,7 @@
           <a:p>
             <a:fld id="{650A9F85-D531-D848-B75D-6ED874705FDB}" type="datetimeFigureOut">
               <a:rPr lang="de-DE" smtClean="0"/>
-              <a:t>27.06.2021</a:t>
+              <a:t>29.06.2021</a:t>
             </a:fld>
             <a:endParaRPr lang="de-DE"/>
           </a:p>
@@ -1108,7 +1108,7 @@
           <a:p>
             <a:fld id="{650A9F85-D531-D848-B75D-6ED874705FDB}" type="datetimeFigureOut">
               <a:rPr lang="de-DE" smtClean="0"/>
-              <a:t>27.06.2021</a:t>
+              <a:t>29.06.2021</a:t>
             </a:fld>
             <a:endParaRPr lang="de-DE"/>
           </a:p>
@@ -1306,7 +1306,7 @@
           <a:p>
             <a:fld id="{650A9F85-D531-D848-B75D-6ED874705FDB}" type="datetimeFigureOut">
               <a:rPr lang="de-DE" smtClean="0"/>
-              <a:t>27.06.2021</a:t>
+              <a:t>29.06.2021</a:t>
             </a:fld>
             <a:endParaRPr lang="de-DE"/>
           </a:p>
@@ -1581,7 +1581,7 @@
           <a:p>
             <a:fld id="{650A9F85-D531-D848-B75D-6ED874705FDB}" type="datetimeFigureOut">
               <a:rPr lang="de-DE" smtClean="0"/>
-              <a:t>27.06.2021</a:t>
+              <a:t>29.06.2021</a:t>
             </a:fld>
             <a:endParaRPr lang="de-DE"/>
           </a:p>
@@ -1846,7 +1846,7 @@
           <a:p>
             <a:fld id="{650A9F85-D531-D848-B75D-6ED874705FDB}" type="datetimeFigureOut">
               <a:rPr lang="de-DE" smtClean="0"/>
-              <a:t>27.06.2021</a:t>
+              <a:t>29.06.2021</a:t>
             </a:fld>
             <a:endParaRPr lang="de-DE"/>
           </a:p>
@@ -2258,7 +2258,7 @@
           <a:p>
             <a:fld id="{650A9F85-D531-D848-B75D-6ED874705FDB}" type="datetimeFigureOut">
               <a:rPr lang="de-DE" smtClean="0"/>
-              <a:t>27.06.2021</a:t>
+              <a:t>29.06.2021</a:t>
             </a:fld>
             <a:endParaRPr lang="de-DE"/>
           </a:p>
@@ -2399,7 +2399,7 @@
           <a:p>
             <a:fld id="{650A9F85-D531-D848-B75D-6ED874705FDB}" type="datetimeFigureOut">
               <a:rPr lang="de-DE" smtClean="0"/>
-              <a:t>27.06.2021</a:t>
+              <a:t>29.06.2021</a:t>
             </a:fld>
             <a:endParaRPr lang="de-DE"/>
           </a:p>
@@ -2512,7 +2512,7 @@
           <a:p>
             <a:fld id="{650A9F85-D531-D848-B75D-6ED874705FDB}" type="datetimeFigureOut">
               <a:rPr lang="de-DE" smtClean="0"/>
-              <a:t>27.06.2021</a:t>
+              <a:t>29.06.2021</a:t>
             </a:fld>
             <a:endParaRPr lang="de-DE"/>
           </a:p>
@@ -2823,7 +2823,7 @@
           <a:p>
             <a:fld id="{650A9F85-D531-D848-B75D-6ED874705FDB}" type="datetimeFigureOut">
               <a:rPr lang="de-DE" smtClean="0"/>
-              <a:t>27.06.2021</a:t>
+              <a:t>29.06.2021</a:t>
             </a:fld>
             <a:endParaRPr lang="de-DE"/>
           </a:p>
@@ -3111,7 +3111,7 @@
           <a:p>
             <a:fld id="{650A9F85-D531-D848-B75D-6ED874705FDB}" type="datetimeFigureOut">
               <a:rPr lang="de-DE" smtClean="0"/>
-              <a:t>27.06.2021</a:t>
+              <a:t>29.06.2021</a:t>
             </a:fld>
             <a:endParaRPr lang="de-DE"/>
           </a:p>
@@ -3352,7 +3352,7 @@
           <a:p>
             <a:fld id="{650A9F85-D531-D848-B75D-6ED874705FDB}" type="datetimeFigureOut">
               <a:rPr lang="de-DE" smtClean="0"/>
-              <a:t>27.06.2021</a:t>
+              <a:t>29.06.2021</a:t>
             </a:fld>
             <a:endParaRPr lang="de-DE"/>
           </a:p>
@@ -5548,34 +5548,601 @@
           </a:p>
         </p:txBody>
       </p:sp>
-      <p:sp>
-        <p:nvSpPr>
-          <p:cNvPr id="3" name="Inhaltsplatzhalter 2">
-            <a:extLst>
-              <a:ext uri="{FF2B5EF4-FFF2-40B4-BE49-F238E27FC236}">
-                <a16:creationId xmlns:a16="http://schemas.microsoft.com/office/drawing/2014/main" id="{B0A48D51-10FF-47FE-87A6-5854934DEBEE}"/>
-              </a:ext>
-            </a:extLst>
-          </p:cNvPr>
-          <p:cNvSpPr>
-            <a:spLocks noGrp="1"/>
-          </p:cNvSpPr>
-          <p:nvPr>
-            <p:ph idx="1"/>
-          </p:nvPr>
-        </p:nvSpPr>
-        <p:spPr/>
-        <p:txBody>
-          <a:bodyPr/>
+      <p:pic>
+        <p:nvPicPr>
+          <p:cNvPr id="8" name="Grafik 7">
+            <a:extLst>
+              <a:ext uri="{FF2B5EF4-FFF2-40B4-BE49-F238E27FC236}">
+                <a16:creationId xmlns:a16="http://schemas.microsoft.com/office/drawing/2014/main" id="{5CF37DAE-770F-41E6-BAF0-5E22A9F7318E}"/>
+              </a:ext>
+            </a:extLst>
+          </p:cNvPr>
+          <p:cNvPicPr>
+            <a:picLocks noChangeAspect="1"/>
+          </p:cNvPicPr>
+          <p:nvPr/>
+        </p:nvPicPr>
+        <p:blipFill rotWithShape="1">
+          <a:blip r:embed="rId2"/>
+          <a:srcRect l="11993" t="6986" r="11464"/>
+          <a:stretch/>
+        </p:blipFill>
+        <p:spPr>
+          <a:xfrm>
+            <a:off x="2421467" y="1469497"/>
+            <a:ext cx="7349066" cy="5023378"/>
+          </a:xfrm>
+          <a:prstGeom prst="rect">
+            <a:avLst/>
+          </a:prstGeom>
+        </p:spPr>
+      </p:pic>
+      <p:sp>
+        <p:nvSpPr>
+          <p:cNvPr id="40" name="Rechteck 39">
+            <a:extLst>
+              <a:ext uri="{FF2B5EF4-FFF2-40B4-BE49-F238E27FC236}">
+                <a16:creationId xmlns:a16="http://schemas.microsoft.com/office/drawing/2014/main" id="{9B80F56A-07B8-4551-844F-E2D801196AF6}"/>
+              </a:ext>
+            </a:extLst>
+          </p:cNvPr>
+          <p:cNvSpPr/>
+          <p:nvPr/>
+        </p:nvSpPr>
+        <p:spPr>
+          <a:xfrm>
+            <a:off x="2294467" y="1397238"/>
+            <a:ext cx="7638738" cy="5164429"/>
+          </a:xfrm>
+          <a:prstGeom prst="rect">
+            <a:avLst/>
+          </a:prstGeom>
+          <a:solidFill>
+            <a:srgbClr val="FFFFFF">
+              <a:alpha val="21961"/>
+            </a:srgbClr>
+          </a:solidFill>
+          <a:ln>
+            <a:noFill/>
+          </a:ln>
+        </p:spPr>
+        <p:style>
+          <a:lnRef idx="2">
+            <a:schemeClr val="accent1">
+              <a:shade val="50000"/>
+            </a:schemeClr>
+          </a:lnRef>
+          <a:fillRef idx="1">
+            <a:schemeClr val="accent1"/>
+          </a:fillRef>
+          <a:effectRef idx="0">
+            <a:schemeClr val="accent1"/>
+          </a:effectRef>
+          <a:fontRef idx="minor">
+            <a:schemeClr val="lt1"/>
+          </a:fontRef>
+        </p:style>
+        <p:txBody>
+          <a:bodyPr rtlCol="0" anchor="ctr"/>
           <a:lstStyle/>
           <a:p>
-            <a:r>
-              <a:rPr lang="de-DE" dirty="0"/>
-              <a:t>Bilder einfügen</a:t>
-            </a:r>
-          </a:p>
-        </p:txBody>
-      </p:sp>
+            <a:pPr algn="ctr"/>
+            <a:endParaRPr lang="de-DE"/>
+          </a:p>
+        </p:txBody>
+      </p:sp>
+      <p:cxnSp>
+        <p:nvCxnSpPr>
+          <p:cNvPr id="10" name="Gerader Verbinder 9">
+            <a:extLst>
+              <a:ext uri="{FF2B5EF4-FFF2-40B4-BE49-F238E27FC236}">
+                <a16:creationId xmlns:a16="http://schemas.microsoft.com/office/drawing/2014/main" id="{998469E2-C1ED-45B8-9ACC-102F909A3496}"/>
+              </a:ext>
+            </a:extLst>
+          </p:cNvPr>
+          <p:cNvCxnSpPr/>
+          <p:nvPr/>
+        </p:nvCxnSpPr>
+        <p:spPr>
+          <a:xfrm flipV="1">
+            <a:off x="8856133" y="2878667"/>
+            <a:ext cx="1193800" cy="668866"/>
+          </a:xfrm>
+          <a:prstGeom prst="line">
+            <a:avLst/>
+          </a:prstGeom>
+          <a:ln w="38100"/>
+        </p:spPr>
+        <p:style>
+          <a:lnRef idx="3">
+            <a:schemeClr val="dk1"/>
+          </a:lnRef>
+          <a:fillRef idx="0">
+            <a:schemeClr val="dk1"/>
+          </a:fillRef>
+          <a:effectRef idx="2">
+            <a:schemeClr val="dk1"/>
+          </a:effectRef>
+          <a:fontRef idx="minor">
+            <a:schemeClr val="tx1"/>
+          </a:fontRef>
+        </p:style>
+      </p:cxnSp>
+      <p:cxnSp>
+        <p:nvCxnSpPr>
+          <p:cNvPr id="11" name="Gerader Verbinder 10">
+            <a:extLst>
+              <a:ext uri="{FF2B5EF4-FFF2-40B4-BE49-F238E27FC236}">
+                <a16:creationId xmlns:a16="http://schemas.microsoft.com/office/drawing/2014/main" id="{0337F207-6CC4-4E21-BD57-330ECBA037F6}"/>
+              </a:ext>
+            </a:extLst>
+          </p:cNvPr>
+          <p:cNvCxnSpPr>
+            <a:cxnSpLocks/>
+          </p:cNvCxnSpPr>
+          <p:nvPr/>
+        </p:nvCxnSpPr>
+        <p:spPr>
+          <a:xfrm>
+            <a:off x="10049933" y="2878667"/>
+            <a:ext cx="262467" cy="0"/>
+          </a:xfrm>
+          <a:prstGeom prst="line">
+            <a:avLst/>
+          </a:prstGeom>
+          <a:ln w="38100"/>
+        </p:spPr>
+        <p:style>
+          <a:lnRef idx="3">
+            <a:schemeClr val="dk1"/>
+          </a:lnRef>
+          <a:fillRef idx="0">
+            <a:schemeClr val="dk1"/>
+          </a:fillRef>
+          <a:effectRef idx="2">
+            <a:schemeClr val="dk1"/>
+          </a:effectRef>
+          <a:fontRef idx="minor">
+            <a:schemeClr val="tx1"/>
+          </a:fontRef>
+        </p:style>
+      </p:cxnSp>
+      <p:cxnSp>
+        <p:nvCxnSpPr>
+          <p:cNvPr id="15" name="Gerader Verbinder 14">
+            <a:extLst>
+              <a:ext uri="{FF2B5EF4-FFF2-40B4-BE49-F238E27FC236}">
+                <a16:creationId xmlns:a16="http://schemas.microsoft.com/office/drawing/2014/main" id="{B9F73FAB-FD92-4459-BA64-54A294DC1B68}"/>
+              </a:ext>
+            </a:extLst>
+          </p:cNvPr>
+          <p:cNvCxnSpPr>
+            <a:cxnSpLocks/>
+          </p:cNvCxnSpPr>
+          <p:nvPr/>
+        </p:nvCxnSpPr>
+        <p:spPr>
+          <a:xfrm flipV="1">
+            <a:off x="8551333" y="2878667"/>
+            <a:ext cx="1498600" cy="1845733"/>
+          </a:xfrm>
+          <a:prstGeom prst="line">
+            <a:avLst/>
+          </a:prstGeom>
+          <a:ln w="38100"/>
+        </p:spPr>
+        <p:style>
+          <a:lnRef idx="3">
+            <a:schemeClr val="dk1"/>
+          </a:lnRef>
+          <a:fillRef idx="0">
+            <a:schemeClr val="dk1"/>
+          </a:fillRef>
+          <a:effectRef idx="2">
+            <a:schemeClr val="dk1"/>
+          </a:effectRef>
+          <a:fontRef idx="minor">
+            <a:schemeClr val="tx1"/>
+          </a:fontRef>
+        </p:style>
+      </p:cxnSp>
+      <p:sp>
+        <p:nvSpPr>
+          <p:cNvPr id="18" name="Textfeld 17">
+            <a:extLst>
+              <a:ext uri="{FF2B5EF4-FFF2-40B4-BE49-F238E27FC236}">
+                <a16:creationId xmlns:a16="http://schemas.microsoft.com/office/drawing/2014/main" id="{FF209625-384D-43F8-B167-67AAB1069CD4}"/>
+              </a:ext>
+            </a:extLst>
+          </p:cNvPr>
+          <p:cNvSpPr txBox="1"/>
+          <p:nvPr/>
+        </p:nvSpPr>
+        <p:spPr>
+          <a:xfrm>
+            <a:off x="10354733" y="2694001"/>
+            <a:ext cx="1687129" cy="369332"/>
+          </a:xfrm>
+          <a:prstGeom prst="rect">
+            <a:avLst/>
+          </a:prstGeom>
+          <a:noFill/>
+        </p:spPr>
+        <p:txBody>
+          <a:bodyPr wrap="none" rtlCol="0">
+            <a:spAutoFit/>
+          </a:bodyPr>
+          <a:lstStyle/>
+          <a:p>
+            <a:r>
+              <a:rPr lang="de-DE" dirty="0">
+                <a:latin typeface="Segoe UI" panose="020B0502040204020203" pitchFamily="34" charset="0"/>
+                <a:cs typeface="Segoe UI" panose="020B0502040204020203" pitchFamily="34" charset="0"/>
+              </a:rPr>
+              <a:t>RFID-Ausweise</a:t>
+            </a:r>
+          </a:p>
+        </p:txBody>
+      </p:sp>
+      <p:sp>
+        <p:nvSpPr>
+          <p:cNvPr id="19" name="Textfeld 18">
+            <a:extLst>
+              <a:ext uri="{FF2B5EF4-FFF2-40B4-BE49-F238E27FC236}">
+                <a16:creationId xmlns:a16="http://schemas.microsoft.com/office/drawing/2014/main" id="{D7159E55-9726-4E7E-8EFB-84D7E25032D5}"/>
+              </a:ext>
+            </a:extLst>
+          </p:cNvPr>
+          <p:cNvSpPr txBox="1"/>
+          <p:nvPr/>
+        </p:nvSpPr>
+        <p:spPr>
+          <a:xfrm>
+            <a:off x="10354733" y="1012574"/>
+            <a:ext cx="1558440" cy="369332"/>
+          </a:xfrm>
+          <a:prstGeom prst="rect">
+            <a:avLst/>
+          </a:prstGeom>
+          <a:noFill/>
+        </p:spPr>
+        <p:txBody>
+          <a:bodyPr wrap="none" rtlCol="0">
+            <a:spAutoFit/>
+          </a:bodyPr>
+          <a:lstStyle/>
+          <a:p>
+            <a:r>
+              <a:rPr lang="de-DE" dirty="0">
+                <a:latin typeface="Segoe UI" panose="020B0502040204020203" pitchFamily="34" charset="0"/>
+                <a:cs typeface="Segoe UI" panose="020B0502040204020203" pitchFamily="34" charset="0"/>
+              </a:rPr>
+              <a:t>RFID-Scanner</a:t>
+            </a:r>
+          </a:p>
+        </p:txBody>
+      </p:sp>
+      <p:cxnSp>
+        <p:nvCxnSpPr>
+          <p:cNvPr id="20" name="Gerader Verbinder 19">
+            <a:extLst>
+              <a:ext uri="{FF2B5EF4-FFF2-40B4-BE49-F238E27FC236}">
+                <a16:creationId xmlns:a16="http://schemas.microsoft.com/office/drawing/2014/main" id="{D54D1EBE-3A6A-4A53-B214-53D85F1BDCBF}"/>
+              </a:ext>
+            </a:extLst>
+          </p:cNvPr>
+          <p:cNvCxnSpPr>
+            <a:cxnSpLocks/>
+          </p:cNvCxnSpPr>
+          <p:nvPr/>
+        </p:nvCxnSpPr>
+        <p:spPr>
+          <a:xfrm>
+            <a:off x="10049933" y="1197240"/>
+            <a:ext cx="262467" cy="0"/>
+          </a:xfrm>
+          <a:prstGeom prst="line">
+            <a:avLst/>
+          </a:prstGeom>
+          <a:ln w="38100"/>
+        </p:spPr>
+        <p:style>
+          <a:lnRef idx="3">
+            <a:schemeClr val="dk1"/>
+          </a:lnRef>
+          <a:fillRef idx="0">
+            <a:schemeClr val="dk1"/>
+          </a:fillRef>
+          <a:effectRef idx="2">
+            <a:schemeClr val="dk1"/>
+          </a:effectRef>
+          <a:fontRef idx="minor">
+            <a:schemeClr val="tx1"/>
+          </a:fontRef>
+        </p:style>
+      </p:cxnSp>
+      <p:cxnSp>
+        <p:nvCxnSpPr>
+          <p:cNvPr id="21" name="Gerader Verbinder 20">
+            <a:extLst>
+              <a:ext uri="{FF2B5EF4-FFF2-40B4-BE49-F238E27FC236}">
+                <a16:creationId xmlns:a16="http://schemas.microsoft.com/office/drawing/2014/main" id="{7F7435E2-F701-4DE4-9B6B-3B2A553AAF75}"/>
+              </a:ext>
+            </a:extLst>
+          </p:cNvPr>
+          <p:cNvCxnSpPr>
+            <a:cxnSpLocks/>
+          </p:cNvCxnSpPr>
+          <p:nvPr/>
+        </p:nvCxnSpPr>
+        <p:spPr>
+          <a:xfrm flipV="1">
+            <a:off x="7975600" y="1197240"/>
+            <a:ext cx="2074333" cy="1012562"/>
+          </a:xfrm>
+          <a:prstGeom prst="line">
+            <a:avLst/>
+          </a:prstGeom>
+          <a:ln w="38100"/>
+        </p:spPr>
+        <p:style>
+          <a:lnRef idx="3">
+            <a:schemeClr val="dk1"/>
+          </a:lnRef>
+          <a:fillRef idx="0">
+            <a:schemeClr val="dk1"/>
+          </a:fillRef>
+          <a:effectRef idx="2">
+            <a:schemeClr val="dk1"/>
+          </a:effectRef>
+          <a:fontRef idx="minor">
+            <a:schemeClr val="tx1"/>
+          </a:fontRef>
+        </p:style>
+      </p:cxnSp>
+      <p:sp>
+        <p:nvSpPr>
+          <p:cNvPr id="24" name="Textfeld 23">
+            <a:extLst>
+              <a:ext uri="{FF2B5EF4-FFF2-40B4-BE49-F238E27FC236}">
+                <a16:creationId xmlns:a16="http://schemas.microsoft.com/office/drawing/2014/main" id="{15D19CFA-07A3-46C5-A0F3-C30A4DBE4DAE}"/>
+              </a:ext>
+            </a:extLst>
+          </p:cNvPr>
+          <p:cNvSpPr txBox="1"/>
+          <p:nvPr/>
+        </p:nvSpPr>
+        <p:spPr>
+          <a:xfrm>
+            <a:off x="252391" y="1027906"/>
+            <a:ext cx="1780872" cy="369332"/>
+          </a:xfrm>
+          <a:prstGeom prst="rect">
+            <a:avLst/>
+          </a:prstGeom>
+          <a:noFill/>
+        </p:spPr>
+        <p:txBody>
+          <a:bodyPr wrap="none" rtlCol="0">
+            <a:spAutoFit/>
+          </a:bodyPr>
+          <a:lstStyle/>
+          <a:p>
+            <a:r>
+              <a:rPr lang="de-DE" dirty="0">
+                <a:latin typeface="Segoe UI" panose="020B0502040204020203" pitchFamily="34" charset="0"/>
+                <a:cs typeface="Segoe UI" panose="020B0502040204020203" pitchFamily="34" charset="0"/>
+              </a:rPr>
+              <a:t>Raspberry Pi 4B</a:t>
+            </a:r>
+          </a:p>
+        </p:txBody>
+      </p:sp>
+      <p:cxnSp>
+        <p:nvCxnSpPr>
+          <p:cNvPr id="25" name="Gerader Verbinder 24">
+            <a:extLst>
+              <a:ext uri="{FF2B5EF4-FFF2-40B4-BE49-F238E27FC236}">
+                <a16:creationId xmlns:a16="http://schemas.microsoft.com/office/drawing/2014/main" id="{59BE7F95-5B8A-4DB0-AFB6-0D9082449FB2}"/>
+              </a:ext>
+            </a:extLst>
+          </p:cNvPr>
+          <p:cNvCxnSpPr>
+            <a:cxnSpLocks/>
+          </p:cNvCxnSpPr>
+          <p:nvPr/>
+        </p:nvCxnSpPr>
+        <p:spPr>
+          <a:xfrm>
+            <a:off x="1953563" y="1212572"/>
+            <a:ext cx="262467" cy="0"/>
+          </a:xfrm>
+          <a:prstGeom prst="line">
+            <a:avLst/>
+          </a:prstGeom>
+          <a:ln w="38100"/>
+        </p:spPr>
+        <p:style>
+          <a:lnRef idx="3">
+            <a:schemeClr val="dk1"/>
+          </a:lnRef>
+          <a:fillRef idx="0">
+            <a:schemeClr val="dk1"/>
+          </a:fillRef>
+          <a:effectRef idx="2">
+            <a:schemeClr val="dk1"/>
+          </a:effectRef>
+          <a:fontRef idx="minor">
+            <a:schemeClr val="tx1"/>
+          </a:fontRef>
+        </p:style>
+      </p:cxnSp>
+      <p:cxnSp>
+        <p:nvCxnSpPr>
+          <p:cNvPr id="26" name="Gerader Verbinder 25">
+            <a:extLst>
+              <a:ext uri="{FF2B5EF4-FFF2-40B4-BE49-F238E27FC236}">
+                <a16:creationId xmlns:a16="http://schemas.microsoft.com/office/drawing/2014/main" id="{00971CD3-5E7E-4793-994C-C368FBC620EB}"/>
+              </a:ext>
+            </a:extLst>
+          </p:cNvPr>
+          <p:cNvCxnSpPr>
+            <a:cxnSpLocks/>
+          </p:cNvCxnSpPr>
+          <p:nvPr/>
+        </p:nvCxnSpPr>
+        <p:spPr>
+          <a:xfrm flipH="1" flipV="1">
+            <a:off x="2211362" y="1212572"/>
+            <a:ext cx="2817838" cy="1850762"/>
+          </a:xfrm>
+          <a:prstGeom prst="line">
+            <a:avLst/>
+          </a:prstGeom>
+          <a:ln w="38100"/>
+        </p:spPr>
+        <p:style>
+          <a:lnRef idx="3">
+            <a:schemeClr val="dk1"/>
+          </a:lnRef>
+          <a:fillRef idx="0">
+            <a:schemeClr val="dk1"/>
+          </a:fillRef>
+          <a:effectRef idx="2">
+            <a:schemeClr val="dk1"/>
+          </a:effectRef>
+          <a:fontRef idx="minor">
+            <a:schemeClr val="tx1"/>
+          </a:fontRef>
+        </p:style>
+      </p:cxnSp>
+      <p:sp>
+        <p:nvSpPr>
+          <p:cNvPr id="29" name="Textfeld 28">
+            <a:extLst>
+              <a:ext uri="{FF2B5EF4-FFF2-40B4-BE49-F238E27FC236}">
+                <a16:creationId xmlns:a16="http://schemas.microsoft.com/office/drawing/2014/main" id="{C9B050C7-922B-4848-A372-7026371C14BC}"/>
+              </a:ext>
+            </a:extLst>
+          </p:cNvPr>
+          <p:cNvSpPr txBox="1"/>
+          <p:nvPr/>
+        </p:nvSpPr>
+        <p:spPr>
+          <a:xfrm>
+            <a:off x="154160" y="3505775"/>
+            <a:ext cx="1850635" cy="646331"/>
+          </a:xfrm>
+          <a:prstGeom prst="rect">
+            <a:avLst/>
+          </a:prstGeom>
+          <a:noFill/>
+        </p:spPr>
+        <p:txBody>
+          <a:bodyPr wrap="none" rtlCol="0">
+            <a:spAutoFit/>
+          </a:bodyPr>
+          <a:lstStyle/>
+          <a:p>
+            <a:pPr algn="ctr"/>
+            <a:r>
+              <a:rPr lang="de-DE" dirty="0">
+                <a:latin typeface="Segoe UI" panose="020B0502040204020203" pitchFamily="34" charset="0"/>
+                <a:cs typeface="Segoe UI" panose="020B0502040204020203" pitchFamily="34" charset="0"/>
+              </a:rPr>
+              <a:t>Taster</a:t>
+            </a:r>
+          </a:p>
+          <a:p>
+            <a:pPr algn="ctr"/>
+            <a:r>
+              <a:rPr lang="de-DE" dirty="0">
+                <a:latin typeface="Segoe UI" panose="020B0502040204020203" pitchFamily="34" charset="0"/>
+                <a:cs typeface="Segoe UI" panose="020B0502040204020203" pitchFamily="34" charset="0"/>
+              </a:rPr>
+              <a:t>(Flugleiterknopf)</a:t>
+            </a:r>
+          </a:p>
+        </p:txBody>
+      </p:sp>
+      <p:cxnSp>
+        <p:nvCxnSpPr>
+          <p:cNvPr id="30" name="Gerader Verbinder 29">
+            <a:extLst>
+              <a:ext uri="{FF2B5EF4-FFF2-40B4-BE49-F238E27FC236}">
+                <a16:creationId xmlns:a16="http://schemas.microsoft.com/office/drawing/2014/main" id="{440233D9-B408-429D-B2DC-C1D6A66DEA12}"/>
+              </a:ext>
+            </a:extLst>
+          </p:cNvPr>
+          <p:cNvCxnSpPr>
+            <a:cxnSpLocks/>
+          </p:cNvCxnSpPr>
+          <p:nvPr/>
+        </p:nvCxnSpPr>
+        <p:spPr>
+          <a:xfrm>
+            <a:off x="1875507" y="3810000"/>
+            <a:ext cx="262467" cy="0"/>
+          </a:xfrm>
+          <a:prstGeom prst="line">
+            <a:avLst/>
+          </a:prstGeom>
+          <a:ln w="38100"/>
+        </p:spPr>
+        <p:style>
+          <a:lnRef idx="3">
+            <a:schemeClr val="dk1"/>
+          </a:lnRef>
+          <a:fillRef idx="0">
+            <a:schemeClr val="dk1"/>
+          </a:fillRef>
+          <a:effectRef idx="2">
+            <a:schemeClr val="dk1"/>
+          </a:effectRef>
+          <a:fontRef idx="minor">
+            <a:schemeClr val="tx1"/>
+          </a:fontRef>
+        </p:style>
+      </p:cxnSp>
+      <p:cxnSp>
+        <p:nvCxnSpPr>
+          <p:cNvPr id="31" name="Gerader Verbinder 30">
+            <a:extLst>
+              <a:ext uri="{FF2B5EF4-FFF2-40B4-BE49-F238E27FC236}">
+                <a16:creationId xmlns:a16="http://schemas.microsoft.com/office/drawing/2014/main" id="{ABC7B88A-1C98-40D4-B713-168A8ECF79FE}"/>
+              </a:ext>
+            </a:extLst>
+          </p:cNvPr>
+          <p:cNvCxnSpPr>
+            <a:cxnSpLocks/>
+          </p:cNvCxnSpPr>
+          <p:nvPr/>
+        </p:nvCxnSpPr>
+        <p:spPr>
+          <a:xfrm flipH="1" flipV="1">
+            <a:off x="2112003" y="3801533"/>
+            <a:ext cx="1274664" cy="575734"/>
+          </a:xfrm>
+          <a:prstGeom prst="line">
+            <a:avLst/>
+          </a:prstGeom>
+          <a:ln w="38100"/>
+        </p:spPr>
+        <p:style>
+          <a:lnRef idx="3">
+            <a:schemeClr val="dk1"/>
+          </a:lnRef>
+          <a:fillRef idx="0">
+            <a:schemeClr val="dk1"/>
+          </a:fillRef>
+          <a:effectRef idx="2">
+            <a:schemeClr val="dk1"/>
+          </a:effectRef>
+          <a:fontRef idx="minor">
+            <a:schemeClr val="tx1"/>
+          </a:fontRef>
+        </p:style>
+      </p:cxnSp>
     </p:spTree>
     <p:extLst>
       <p:ext uri="{BB962C8B-B14F-4D97-AF65-F5344CB8AC3E}">
@@ -5586,6 +6153,551 @@
   <p:clrMapOvr>
     <a:masterClrMapping/>
   </p:clrMapOvr>
+  <p:timing>
+    <p:tnLst>
+      <p:par>
+        <p:cTn id="1" dur="indefinite" restart="never" nodeType="tmRoot">
+          <p:childTnLst>
+            <p:seq concurrent="1" nextAc="seek">
+              <p:cTn id="2" dur="indefinite" nodeType="mainSeq">
+                <p:childTnLst>
+                  <p:par>
+                    <p:cTn id="3" fill="hold">
+                      <p:stCondLst>
+                        <p:cond delay="indefinite"/>
+                      </p:stCondLst>
+                      <p:childTnLst>
+                        <p:par>
+                          <p:cTn id="4" fill="hold">
+                            <p:stCondLst>
+                              <p:cond delay="0"/>
+                            </p:stCondLst>
+                            <p:childTnLst>
+                              <p:par>
+                                <p:cTn id="5" presetID="10" presetClass="entr" presetSubtype="0" fill="hold" grpId="0" nodeType="clickEffect">
+                                  <p:stCondLst>
+                                    <p:cond delay="0"/>
+                                  </p:stCondLst>
+                                  <p:childTnLst>
+                                    <p:set>
+                                      <p:cBhvr>
+                                        <p:cTn id="6" dur="1" fill="hold">
+                                          <p:stCondLst>
+                                            <p:cond delay="0"/>
+                                          </p:stCondLst>
+                                        </p:cTn>
+                                        <p:tgtEl>
+                                          <p:spTgt spid="40"/>
+                                        </p:tgtEl>
+                                        <p:attrNameLst>
+                                          <p:attrName>style.visibility</p:attrName>
+                                        </p:attrNameLst>
+                                      </p:cBhvr>
+                                      <p:to>
+                                        <p:strVal val="visible"/>
+                                      </p:to>
+                                    </p:set>
+                                    <p:animEffect transition="in" filter="fade">
+                                      <p:cBhvr>
+                                        <p:cTn id="7" dur="500"/>
+                                        <p:tgtEl>
+                                          <p:spTgt spid="40"/>
+                                        </p:tgtEl>
+                                      </p:cBhvr>
+                                    </p:animEffect>
+                                  </p:childTnLst>
+                                </p:cTn>
+                              </p:par>
+                              <p:par>
+                                <p:cTn id="8" presetID="10" presetClass="entr" presetSubtype="0" fill="hold" grpId="0" nodeType="withEffect">
+                                  <p:stCondLst>
+                                    <p:cond delay="0"/>
+                                  </p:stCondLst>
+                                  <p:childTnLst>
+                                    <p:set>
+                                      <p:cBhvr>
+                                        <p:cTn id="9" dur="1" fill="hold">
+                                          <p:stCondLst>
+                                            <p:cond delay="0"/>
+                                          </p:stCondLst>
+                                        </p:cTn>
+                                        <p:tgtEl>
+                                          <p:spTgt spid="24"/>
+                                        </p:tgtEl>
+                                        <p:attrNameLst>
+                                          <p:attrName>style.visibility</p:attrName>
+                                        </p:attrNameLst>
+                                      </p:cBhvr>
+                                      <p:to>
+                                        <p:strVal val="visible"/>
+                                      </p:to>
+                                    </p:set>
+                                    <p:animEffect transition="in" filter="fade">
+                                      <p:cBhvr>
+                                        <p:cTn id="10" dur="500"/>
+                                        <p:tgtEl>
+                                          <p:spTgt spid="24"/>
+                                        </p:tgtEl>
+                                      </p:cBhvr>
+                                    </p:animEffect>
+                                  </p:childTnLst>
+                                </p:cTn>
+                              </p:par>
+                              <p:par>
+                                <p:cTn id="11" presetID="10" presetClass="entr" presetSubtype="0" fill="hold" nodeType="withEffect">
+                                  <p:stCondLst>
+                                    <p:cond delay="0"/>
+                                  </p:stCondLst>
+                                  <p:childTnLst>
+                                    <p:set>
+                                      <p:cBhvr>
+                                        <p:cTn id="12" dur="1" fill="hold">
+                                          <p:stCondLst>
+                                            <p:cond delay="0"/>
+                                          </p:stCondLst>
+                                        </p:cTn>
+                                        <p:tgtEl>
+                                          <p:spTgt spid="26"/>
+                                        </p:tgtEl>
+                                        <p:attrNameLst>
+                                          <p:attrName>style.visibility</p:attrName>
+                                        </p:attrNameLst>
+                                      </p:cBhvr>
+                                      <p:to>
+                                        <p:strVal val="visible"/>
+                                      </p:to>
+                                    </p:set>
+                                    <p:animEffect transition="in" filter="fade">
+                                      <p:cBhvr>
+                                        <p:cTn id="13" dur="500"/>
+                                        <p:tgtEl>
+                                          <p:spTgt spid="26"/>
+                                        </p:tgtEl>
+                                      </p:cBhvr>
+                                    </p:animEffect>
+                                  </p:childTnLst>
+                                </p:cTn>
+                              </p:par>
+                              <p:par>
+                                <p:cTn id="14" presetID="10" presetClass="entr" presetSubtype="0" fill="hold" nodeType="withEffect">
+                                  <p:stCondLst>
+                                    <p:cond delay="0"/>
+                                  </p:stCondLst>
+                                  <p:childTnLst>
+                                    <p:set>
+                                      <p:cBhvr>
+                                        <p:cTn id="15" dur="1" fill="hold">
+                                          <p:stCondLst>
+                                            <p:cond delay="0"/>
+                                          </p:stCondLst>
+                                        </p:cTn>
+                                        <p:tgtEl>
+                                          <p:spTgt spid="25"/>
+                                        </p:tgtEl>
+                                        <p:attrNameLst>
+                                          <p:attrName>style.visibility</p:attrName>
+                                        </p:attrNameLst>
+                                      </p:cBhvr>
+                                      <p:to>
+                                        <p:strVal val="visible"/>
+                                      </p:to>
+                                    </p:set>
+                                    <p:animEffect transition="in" filter="fade">
+                                      <p:cBhvr>
+                                        <p:cTn id="16" dur="500"/>
+                                        <p:tgtEl>
+                                          <p:spTgt spid="25"/>
+                                        </p:tgtEl>
+                                      </p:cBhvr>
+                                    </p:animEffect>
+                                  </p:childTnLst>
+                                </p:cTn>
+                              </p:par>
+                              <p:par>
+                                <p:cTn id="17" presetID="10" presetClass="entr" presetSubtype="0" fill="hold" nodeType="withEffect">
+                                  <p:stCondLst>
+                                    <p:cond delay="0"/>
+                                  </p:stCondLst>
+                                  <p:childTnLst>
+                                    <p:set>
+                                      <p:cBhvr>
+                                        <p:cTn id="18" dur="1" fill="hold">
+                                          <p:stCondLst>
+                                            <p:cond delay="0"/>
+                                          </p:stCondLst>
+                                        </p:cTn>
+                                        <p:tgtEl>
+                                          <p:spTgt spid="31"/>
+                                        </p:tgtEl>
+                                        <p:attrNameLst>
+                                          <p:attrName>style.visibility</p:attrName>
+                                        </p:attrNameLst>
+                                      </p:cBhvr>
+                                      <p:to>
+                                        <p:strVal val="visible"/>
+                                      </p:to>
+                                    </p:set>
+                                    <p:animEffect transition="in" filter="fade">
+                                      <p:cBhvr>
+                                        <p:cTn id="19" dur="500"/>
+                                        <p:tgtEl>
+                                          <p:spTgt spid="31"/>
+                                        </p:tgtEl>
+                                      </p:cBhvr>
+                                    </p:animEffect>
+                                  </p:childTnLst>
+                                </p:cTn>
+                              </p:par>
+                              <p:par>
+                                <p:cTn id="20" presetID="10" presetClass="entr" presetSubtype="0" fill="hold" nodeType="withEffect">
+                                  <p:stCondLst>
+                                    <p:cond delay="0"/>
+                                  </p:stCondLst>
+                                  <p:childTnLst>
+                                    <p:set>
+                                      <p:cBhvr>
+                                        <p:cTn id="21" dur="1" fill="hold">
+                                          <p:stCondLst>
+                                            <p:cond delay="0"/>
+                                          </p:stCondLst>
+                                        </p:cTn>
+                                        <p:tgtEl>
+                                          <p:spTgt spid="30"/>
+                                        </p:tgtEl>
+                                        <p:attrNameLst>
+                                          <p:attrName>style.visibility</p:attrName>
+                                        </p:attrNameLst>
+                                      </p:cBhvr>
+                                      <p:to>
+                                        <p:strVal val="visible"/>
+                                      </p:to>
+                                    </p:set>
+                                    <p:animEffect transition="in" filter="fade">
+                                      <p:cBhvr>
+                                        <p:cTn id="22" dur="500"/>
+                                        <p:tgtEl>
+                                          <p:spTgt spid="30"/>
+                                        </p:tgtEl>
+                                      </p:cBhvr>
+                                    </p:animEffect>
+                                  </p:childTnLst>
+                                </p:cTn>
+                              </p:par>
+                              <p:par>
+                                <p:cTn id="23" presetID="10" presetClass="entr" presetSubtype="0" fill="hold" grpId="0" nodeType="withEffect">
+                                  <p:stCondLst>
+                                    <p:cond delay="0"/>
+                                  </p:stCondLst>
+                                  <p:childTnLst>
+                                    <p:set>
+                                      <p:cBhvr>
+                                        <p:cTn id="24" dur="1" fill="hold">
+                                          <p:stCondLst>
+                                            <p:cond delay="0"/>
+                                          </p:stCondLst>
+                                        </p:cTn>
+                                        <p:tgtEl>
+                                          <p:spTgt spid="29"/>
+                                        </p:tgtEl>
+                                        <p:attrNameLst>
+                                          <p:attrName>style.visibility</p:attrName>
+                                        </p:attrNameLst>
+                                      </p:cBhvr>
+                                      <p:to>
+                                        <p:strVal val="visible"/>
+                                      </p:to>
+                                    </p:set>
+                                    <p:animEffect transition="in" filter="fade">
+                                      <p:cBhvr>
+                                        <p:cTn id="25" dur="500"/>
+                                        <p:tgtEl>
+                                          <p:spTgt spid="29"/>
+                                        </p:tgtEl>
+                                      </p:cBhvr>
+                                    </p:animEffect>
+                                  </p:childTnLst>
+                                </p:cTn>
+                              </p:par>
+                              <p:par>
+                                <p:cTn id="26" presetID="10" presetClass="entr" presetSubtype="0" fill="hold" grpId="0" nodeType="withEffect">
+                                  <p:stCondLst>
+                                    <p:cond delay="0"/>
+                                  </p:stCondLst>
+                                  <p:childTnLst>
+                                    <p:set>
+                                      <p:cBhvr>
+                                        <p:cTn id="27" dur="1" fill="hold">
+                                          <p:stCondLst>
+                                            <p:cond delay="0"/>
+                                          </p:stCondLst>
+                                        </p:cTn>
+                                        <p:tgtEl>
+                                          <p:spTgt spid="18"/>
+                                        </p:tgtEl>
+                                        <p:attrNameLst>
+                                          <p:attrName>style.visibility</p:attrName>
+                                        </p:attrNameLst>
+                                      </p:cBhvr>
+                                      <p:to>
+                                        <p:strVal val="visible"/>
+                                      </p:to>
+                                    </p:set>
+                                    <p:animEffect transition="in" filter="fade">
+                                      <p:cBhvr>
+                                        <p:cTn id="28" dur="500"/>
+                                        <p:tgtEl>
+                                          <p:spTgt spid="18"/>
+                                        </p:tgtEl>
+                                      </p:cBhvr>
+                                    </p:animEffect>
+                                  </p:childTnLst>
+                                </p:cTn>
+                              </p:par>
+                              <p:par>
+                                <p:cTn id="29" presetID="10" presetClass="entr" presetSubtype="0" fill="hold" grpId="0" nodeType="withEffect">
+                                  <p:stCondLst>
+                                    <p:cond delay="0"/>
+                                  </p:stCondLst>
+                                  <p:childTnLst>
+                                    <p:set>
+                                      <p:cBhvr>
+                                        <p:cTn id="30" dur="1" fill="hold">
+                                          <p:stCondLst>
+                                            <p:cond delay="0"/>
+                                          </p:stCondLst>
+                                        </p:cTn>
+                                        <p:tgtEl>
+                                          <p:spTgt spid="19"/>
+                                        </p:tgtEl>
+                                        <p:attrNameLst>
+                                          <p:attrName>style.visibility</p:attrName>
+                                        </p:attrNameLst>
+                                      </p:cBhvr>
+                                      <p:to>
+                                        <p:strVal val="visible"/>
+                                      </p:to>
+                                    </p:set>
+                                    <p:animEffect transition="in" filter="fade">
+                                      <p:cBhvr>
+                                        <p:cTn id="31" dur="500"/>
+                                        <p:tgtEl>
+                                          <p:spTgt spid="19"/>
+                                        </p:tgtEl>
+                                      </p:cBhvr>
+                                    </p:animEffect>
+                                  </p:childTnLst>
+                                </p:cTn>
+                              </p:par>
+                              <p:par>
+                                <p:cTn id="32" presetID="10" presetClass="entr" presetSubtype="0" fill="hold" nodeType="withEffect">
+                                  <p:stCondLst>
+                                    <p:cond delay="0"/>
+                                  </p:stCondLst>
+                                  <p:childTnLst>
+                                    <p:set>
+                                      <p:cBhvr>
+                                        <p:cTn id="33" dur="1" fill="hold">
+                                          <p:stCondLst>
+                                            <p:cond delay="0"/>
+                                          </p:stCondLst>
+                                        </p:cTn>
+                                        <p:tgtEl>
+                                          <p:spTgt spid="20"/>
+                                        </p:tgtEl>
+                                        <p:attrNameLst>
+                                          <p:attrName>style.visibility</p:attrName>
+                                        </p:attrNameLst>
+                                      </p:cBhvr>
+                                      <p:to>
+                                        <p:strVal val="visible"/>
+                                      </p:to>
+                                    </p:set>
+                                    <p:animEffect transition="in" filter="fade">
+                                      <p:cBhvr>
+                                        <p:cTn id="34" dur="500"/>
+                                        <p:tgtEl>
+                                          <p:spTgt spid="20"/>
+                                        </p:tgtEl>
+                                      </p:cBhvr>
+                                    </p:animEffect>
+                                  </p:childTnLst>
+                                </p:cTn>
+                              </p:par>
+                              <p:par>
+                                <p:cTn id="35" presetID="10" presetClass="entr" presetSubtype="0" fill="hold" nodeType="withEffect">
+                                  <p:stCondLst>
+                                    <p:cond delay="0"/>
+                                  </p:stCondLst>
+                                  <p:childTnLst>
+                                    <p:set>
+                                      <p:cBhvr>
+                                        <p:cTn id="36" dur="1" fill="hold">
+                                          <p:stCondLst>
+                                            <p:cond delay="0"/>
+                                          </p:stCondLst>
+                                        </p:cTn>
+                                        <p:tgtEl>
+                                          <p:spTgt spid="21"/>
+                                        </p:tgtEl>
+                                        <p:attrNameLst>
+                                          <p:attrName>style.visibility</p:attrName>
+                                        </p:attrNameLst>
+                                      </p:cBhvr>
+                                      <p:to>
+                                        <p:strVal val="visible"/>
+                                      </p:to>
+                                    </p:set>
+                                    <p:animEffect transition="in" filter="fade">
+                                      <p:cBhvr>
+                                        <p:cTn id="37" dur="500"/>
+                                        <p:tgtEl>
+                                          <p:spTgt spid="21"/>
+                                        </p:tgtEl>
+                                      </p:cBhvr>
+                                    </p:animEffect>
+                                  </p:childTnLst>
+                                </p:cTn>
+                              </p:par>
+                              <p:par>
+                                <p:cTn id="38" presetID="10" presetClass="entr" presetSubtype="0" fill="hold" nodeType="withEffect">
+                                  <p:stCondLst>
+                                    <p:cond delay="0"/>
+                                  </p:stCondLst>
+                                  <p:childTnLst>
+                                    <p:set>
+                                      <p:cBhvr>
+                                        <p:cTn id="39" dur="1" fill="hold">
+                                          <p:stCondLst>
+                                            <p:cond delay="0"/>
+                                          </p:stCondLst>
+                                        </p:cTn>
+                                        <p:tgtEl>
+                                          <p:spTgt spid="11"/>
+                                        </p:tgtEl>
+                                        <p:attrNameLst>
+                                          <p:attrName>style.visibility</p:attrName>
+                                        </p:attrNameLst>
+                                      </p:cBhvr>
+                                      <p:to>
+                                        <p:strVal val="visible"/>
+                                      </p:to>
+                                    </p:set>
+                                    <p:animEffect transition="in" filter="fade">
+                                      <p:cBhvr>
+                                        <p:cTn id="40" dur="500"/>
+                                        <p:tgtEl>
+                                          <p:spTgt spid="11"/>
+                                        </p:tgtEl>
+                                      </p:cBhvr>
+                                    </p:animEffect>
+                                  </p:childTnLst>
+                                </p:cTn>
+                              </p:par>
+                              <p:par>
+                                <p:cTn id="41" presetID="10" presetClass="entr" presetSubtype="0" fill="hold" nodeType="withEffect">
+                                  <p:stCondLst>
+                                    <p:cond delay="0"/>
+                                  </p:stCondLst>
+                                  <p:childTnLst>
+                                    <p:set>
+                                      <p:cBhvr>
+                                        <p:cTn id="42" dur="1" fill="hold">
+                                          <p:stCondLst>
+                                            <p:cond delay="0"/>
+                                          </p:stCondLst>
+                                        </p:cTn>
+                                        <p:tgtEl>
+                                          <p:spTgt spid="10"/>
+                                        </p:tgtEl>
+                                        <p:attrNameLst>
+                                          <p:attrName>style.visibility</p:attrName>
+                                        </p:attrNameLst>
+                                      </p:cBhvr>
+                                      <p:to>
+                                        <p:strVal val="visible"/>
+                                      </p:to>
+                                    </p:set>
+                                    <p:animEffect transition="in" filter="fade">
+                                      <p:cBhvr>
+                                        <p:cTn id="43" dur="500"/>
+                                        <p:tgtEl>
+                                          <p:spTgt spid="10"/>
+                                        </p:tgtEl>
+                                      </p:cBhvr>
+                                    </p:animEffect>
+                                  </p:childTnLst>
+                                </p:cTn>
+                              </p:par>
+                              <p:par>
+                                <p:cTn id="44" presetID="10" presetClass="entr" presetSubtype="0" fill="hold" nodeType="withEffect">
+                                  <p:stCondLst>
+                                    <p:cond delay="0"/>
+                                  </p:stCondLst>
+                                  <p:childTnLst>
+                                    <p:set>
+                                      <p:cBhvr>
+                                        <p:cTn id="45" dur="1" fill="hold">
+                                          <p:stCondLst>
+                                            <p:cond delay="0"/>
+                                          </p:stCondLst>
+                                        </p:cTn>
+                                        <p:tgtEl>
+                                          <p:spTgt spid="15"/>
+                                        </p:tgtEl>
+                                        <p:attrNameLst>
+                                          <p:attrName>style.visibility</p:attrName>
+                                        </p:attrNameLst>
+                                      </p:cBhvr>
+                                      <p:to>
+                                        <p:strVal val="visible"/>
+                                      </p:to>
+                                    </p:set>
+                                    <p:animEffect transition="in" filter="fade">
+                                      <p:cBhvr>
+                                        <p:cTn id="46" dur="500"/>
+                                        <p:tgtEl>
+                                          <p:spTgt spid="15"/>
+                                        </p:tgtEl>
+                                      </p:cBhvr>
+                                    </p:animEffect>
+                                  </p:childTnLst>
+                                </p:cTn>
+                              </p:par>
+                            </p:childTnLst>
+                          </p:cTn>
+                        </p:par>
+                      </p:childTnLst>
+                    </p:cTn>
+                  </p:par>
+                </p:childTnLst>
+              </p:cTn>
+              <p:prevCondLst>
+                <p:cond evt="onPrev" delay="0">
+                  <p:tgtEl>
+                    <p:sldTgt/>
+                  </p:tgtEl>
+                </p:cond>
+              </p:prevCondLst>
+              <p:nextCondLst>
+                <p:cond evt="onNext" delay="0">
+                  <p:tgtEl>
+                    <p:sldTgt/>
+                  </p:tgtEl>
+                </p:cond>
+              </p:nextCondLst>
+            </p:seq>
+          </p:childTnLst>
+        </p:cTn>
+      </p:par>
+    </p:tnLst>
+    <p:bldLst>
+      <p:bldP spid="40" grpId="0" animBg="1"/>
+      <p:bldP spid="18" grpId="0"/>
+      <p:bldP spid="19" grpId="0"/>
+      <p:bldP spid="24" grpId="0"/>
+      <p:bldP spid="29" grpId="0"/>
+    </p:bldLst>
+  </p:timing>
 </p:sld>
 </file>
 

</xml_diff>